<commit_message>
lots of new and organized stuff
</commit_message>
<xml_diff>
--- a/SCSM.Support.Tools.mpb/Misc/MP_Dependencies.pptx
+++ b/SCSM.Support.Tools.mpb/Misc/MP_Dependencies.pptx
@@ -104,7 +104,89 @@
       </a:defRPr>
     </a:lvl9pPr>
   </p:defaultTextStyle>
+  <p:extLst>
+    <p:ext uri="{EFAFB233-063F-42B5-8137-9DF3F51BA10A}">
+      <p15:sldGuideLst xmlns:p15="http://schemas.microsoft.com/office/powerpoint/2012/main"/>
+    </p:ext>
+  </p:extLst>
 </p:presentation>
+</file>
+
+<file path=ppt/revisionInfo.xml><?xml version="1.0" encoding="utf-8"?>
+<p1510:revInfo xmlns:a="http://schemas.openxmlformats.org/drawingml/2006/main" xmlns:r="http://schemas.openxmlformats.org/officeDocument/2006/relationships" xmlns:p1510="http://schemas.microsoft.com/office/powerpoint/2015/10/main">
+  <p1510:revLst>
+    <p1510:client id="{25CC26F4-E22D-4756-8F38-5EFF1A97F774}" v="3" dt="2024-02-16T14:35:35.616"/>
+  </p1510:revLst>
+</p1510:revInfo>
+</file>
+
+<file path=ppt/changesInfos/changesInfo1.xml><?xml version="1.0" encoding="utf-8"?>
+<pc:chgInfo xmlns:a="http://schemas.openxmlformats.org/drawingml/2006/main" xmlns:r="http://schemas.openxmlformats.org/officeDocument/2006/relationships" xmlns:ac="http://schemas.microsoft.com/office/drawing/2013/main/command" xmlns:pc="http://schemas.microsoft.com/office/powerpoint/2013/main/command">
+  <pc:docChgLst>
+    <pc:chgData name="Kubilay Hüsmenoglu" userId="613ddf6e-fb7a-458e-b2da-f8a80fdeaf92" providerId="ADAL" clId="{25CC26F4-E22D-4756-8F38-5EFF1A97F774}"/>
+    <pc:docChg chg="modSld">
+      <pc:chgData name="Kubilay Hüsmenoglu" userId="613ddf6e-fb7a-458e-b2da-f8a80fdeaf92" providerId="ADAL" clId="{25CC26F4-E22D-4756-8F38-5EFF1A97F774}" dt="2024-02-16T14:36:34.843" v="87" actId="1036"/>
+      <pc:docMkLst>
+        <pc:docMk/>
+      </pc:docMkLst>
+      <pc:sldChg chg="addSp modSp mod">
+        <pc:chgData name="Kubilay Hüsmenoglu" userId="613ddf6e-fb7a-458e-b2da-f8a80fdeaf92" providerId="ADAL" clId="{25CC26F4-E22D-4756-8F38-5EFF1A97F774}" dt="2024-02-16T14:36:34.843" v="87" actId="1036"/>
+        <pc:sldMkLst>
+          <pc:docMk/>
+          <pc:sldMk cId="3155418598" sldId="256"/>
+        </pc:sldMkLst>
+        <pc:spChg chg="add mod">
+          <ac:chgData name="Kubilay Hüsmenoglu" userId="613ddf6e-fb7a-458e-b2da-f8a80fdeaf92" providerId="ADAL" clId="{25CC26F4-E22D-4756-8F38-5EFF1A97F774}" dt="2024-02-16T14:34:03.476" v="27" actId="14100"/>
+          <ac:spMkLst>
+            <pc:docMk/>
+            <pc:sldMk cId="3155418598" sldId="256"/>
+            <ac:spMk id="2" creationId="{2CC1710A-2DCE-7FC9-2C27-778E83819348}"/>
+          </ac:spMkLst>
+        </pc:spChg>
+        <pc:spChg chg="add mod">
+          <ac:chgData name="Kubilay Hüsmenoglu" userId="613ddf6e-fb7a-458e-b2da-f8a80fdeaf92" providerId="ADAL" clId="{25CC26F4-E22D-4756-8F38-5EFF1A97F774}" dt="2024-02-16T14:34:39.568" v="31" actId="14100"/>
+          <ac:spMkLst>
+            <pc:docMk/>
+            <pc:sldMk cId="3155418598" sldId="256"/>
+            <ac:spMk id="3" creationId="{E64F3C3B-B51E-BAEE-B66E-8F15064BA760}"/>
+          </ac:spMkLst>
+        </pc:spChg>
+        <pc:spChg chg="add mod">
+          <ac:chgData name="Kubilay Hüsmenoglu" userId="613ddf6e-fb7a-458e-b2da-f8a80fdeaf92" providerId="ADAL" clId="{25CC26F4-E22D-4756-8F38-5EFF1A97F774}" dt="2024-02-16T14:35:06.274" v="47" actId="14100"/>
+          <ac:spMkLst>
+            <pc:docMk/>
+            <pc:sldMk cId="3155418598" sldId="256"/>
+            <ac:spMk id="5" creationId="{1F8FE984-6C73-9CDB-D0D1-ECA1CC961790}"/>
+          </ac:spMkLst>
+        </pc:spChg>
+        <pc:spChg chg="add mod">
+          <ac:chgData name="Kubilay Hüsmenoglu" userId="613ddf6e-fb7a-458e-b2da-f8a80fdeaf92" providerId="ADAL" clId="{25CC26F4-E22D-4756-8F38-5EFF1A97F774}" dt="2024-02-16T14:36:02.190" v="84" actId="20577"/>
+          <ac:spMkLst>
+            <pc:docMk/>
+            <pc:sldMk cId="3155418598" sldId="256"/>
+            <ac:spMk id="11" creationId="{7A0EEBE0-7D59-5C1B-A3FC-06ADD3E92E19}"/>
+          </ac:spMkLst>
+        </pc:spChg>
+        <pc:spChg chg="mod">
+          <ac:chgData name="Kubilay Hüsmenoglu" userId="613ddf6e-fb7a-458e-b2da-f8a80fdeaf92" providerId="ADAL" clId="{25CC26F4-E22D-4756-8F38-5EFF1A97F774}" dt="2024-02-16T14:36:34.843" v="87" actId="1036"/>
+          <ac:spMkLst>
+            <pc:docMk/>
+            <pc:sldMk cId="3155418598" sldId="256"/>
+            <ac:spMk id="47" creationId="{5BF2C3F1-4C70-5AE8-D1BE-3C19CC6DE537}"/>
+          </ac:spMkLst>
+        </pc:spChg>
+        <pc:cxnChg chg="add">
+          <ac:chgData name="Kubilay Hüsmenoglu" userId="613ddf6e-fb7a-458e-b2da-f8a80fdeaf92" providerId="ADAL" clId="{25CC26F4-E22D-4756-8F38-5EFF1A97F774}" dt="2024-02-16T14:36:27.522" v="85" actId="11529"/>
+          <ac:cxnSpMkLst>
+            <pc:docMk/>
+            <pc:sldMk cId="3155418598" sldId="256"/>
+            <ac:cxnSpMk id="17" creationId="{E1E0FA9A-E4CE-CF93-CDAE-2885E094728F}"/>
+          </ac:cxnSpMkLst>
+        </pc:cxnChg>
+      </pc:sldChg>
+    </pc:docChg>
+  </pc:docChgLst>
+</pc:chgInfo>
 </file>
 
 <file path=ppt/slideLayouts/slideLayout1.xml><?xml version="1.0" encoding="utf-8"?>
@@ -254,7 +336,7 @@
           <a:p>
             <a:fld id="{C185314F-07B6-4DAB-A9C1-68515819A64A}" type="datetimeFigureOut">
               <a:rPr lang="en-US" smtClean="0"/>
-              <a:t>2/15/2024</a:t>
+              <a:t>2/16/2024</a:t>
             </a:fld>
             <a:endParaRPr lang="en-US"/>
           </a:p>
@@ -452,7 +534,7 @@
           <a:p>
             <a:fld id="{C185314F-07B6-4DAB-A9C1-68515819A64A}" type="datetimeFigureOut">
               <a:rPr lang="en-US" smtClean="0"/>
-              <a:t>2/15/2024</a:t>
+              <a:t>2/16/2024</a:t>
             </a:fld>
             <a:endParaRPr lang="en-US"/>
           </a:p>
@@ -660,7 +742,7 @@
           <a:p>
             <a:fld id="{C185314F-07B6-4DAB-A9C1-68515819A64A}" type="datetimeFigureOut">
               <a:rPr lang="en-US" smtClean="0"/>
-              <a:t>2/15/2024</a:t>
+              <a:t>2/16/2024</a:t>
             </a:fld>
             <a:endParaRPr lang="en-US"/>
           </a:p>
@@ -858,7 +940,7 @@
           <a:p>
             <a:fld id="{C185314F-07B6-4DAB-A9C1-68515819A64A}" type="datetimeFigureOut">
               <a:rPr lang="en-US" smtClean="0"/>
-              <a:t>2/15/2024</a:t>
+              <a:t>2/16/2024</a:t>
             </a:fld>
             <a:endParaRPr lang="en-US"/>
           </a:p>
@@ -1133,7 +1215,7 @@
           <a:p>
             <a:fld id="{C185314F-07B6-4DAB-A9C1-68515819A64A}" type="datetimeFigureOut">
               <a:rPr lang="en-US" smtClean="0"/>
-              <a:t>2/15/2024</a:t>
+              <a:t>2/16/2024</a:t>
             </a:fld>
             <a:endParaRPr lang="en-US"/>
           </a:p>
@@ -1398,7 +1480,7 @@
           <a:p>
             <a:fld id="{C185314F-07B6-4DAB-A9C1-68515819A64A}" type="datetimeFigureOut">
               <a:rPr lang="en-US" smtClean="0"/>
-              <a:t>2/15/2024</a:t>
+              <a:t>2/16/2024</a:t>
             </a:fld>
             <a:endParaRPr lang="en-US"/>
           </a:p>
@@ -1810,7 +1892,7 @@
           <a:p>
             <a:fld id="{C185314F-07B6-4DAB-A9C1-68515819A64A}" type="datetimeFigureOut">
               <a:rPr lang="en-US" smtClean="0"/>
-              <a:t>2/15/2024</a:t>
+              <a:t>2/16/2024</a:t>
             </a:fld>
             <a:endParaRPr lang="en-US"/>
           </a:p>
@@ -1951,7 +2033,7 @@
           <a:p>
             <a:fld id="{C185314F-07B6-4DAB-A9C1-68515819A64A}" type="datetimeFigureOut">
               <a:rPr lang="en-US" smtClean="0"/>
-              <a:t>2/15/2024</a:t>
+              <a:t>2/16/2024</a:t>
             </a:fld>
             <a:endParaRPr lang="en-US"/>
           </a:p>
@@ -2064,7 +2146,7 @@
           <a:p>
             <a:fld id="{C185314F-07B6-4DAB-A9C1-68515819A64A}" type="datetimeFigureOut">
               <a:rPr lang="en-US" smtClean="0"/>
-              <a:t>2/15/2024</a:t>
+              <a:t>2/16/2024</a:t>
             </a:fld>
             <a:endParaRPr lang="en-US"/>
           </a:p>
@@ -2375,7 +2457,7 @@
           <a:p>
             <a:fld id="{C185314F-07B6-4DAB-A9C1-68515819A64A}" type="datetimeFigureOut">
               <a:rPr lang="en-US" smtClean="0"/>
-              <a:t>2/15/2024</a:t>
+              <a:t>2/16/2024</a:t>
             </a:fld>
             <a:endParaRPr lang="en-US"/>
           </a:p>
@@ -2663,7 +2745,7 @@
           <a:p>
             <a:fld id="{C185314F-07B6-4DAB-A9C1-68515819A64A}" type="datetimeFigureOut">
               <a:rPr lang="en-US" smtClean="0"/>
-              <a:t>2/15/2024</a:t>
+              <a:t>2/16/2024</a:t>
             </a:fld>
             <a:endParaRPr lang="en-US"/>
           </a:p>
@@ -2904,7 +2986,7 @@
           <a:p>
             <a:fld id="{C185314F-07B6-4DAB-A9C1-68515819A64A}" type="datetimeFigureOut">
               <a:rPr lang="en-US" smtClean="0"/>
-              <a:t>2/15/2024</a:t>
+              <a:t>2/16/2024</a:t>
             </a:fld>
             <a:endParaRPr lang="en-US"/>
           </a:p>
@@ -4335,7 +4417,7 @@
         </p:nvSpPr>
         <p:spPr>
           <a:xfrm>
-            <a:off x="152771" y="5297260"/>
+            <a:off x="152771" y="5319294"/>
             <a:ext cx="11764407" cy="307777"/>
           </a:xfrm>
           <a:prstGeom prst="rect">
@@ -4357,6 +4439,298 @@
           </a:p>
         </p:txBody>
       </p:sp>
+      <p:sp>
+        <p:nvSpPr>
+          <p:cNvPr id="2" name="Teardrop 1">
+            <a:extLst>
+              <a:ext uri="{FF2B5EF4-FFF2-40B4-BE49-F238E27FC236}">
+                <a16:creationId xmlns:a16="http://schemas.microsoft.com/office/drawing/2014/main" id="{2CC1710A-2DCE-7FC9-2C27-778E83819348}"/>
+              </a:ext>
+            </a:extLst>
+          </p:cNvPr>
+          <p:cNvSpPr/>
+          <p:nvPr/>
+        </p:nvSpPr>
+        <p:spPr>
+          <a:xfrm>
+            <a:off x="342452" y="1938969"/>
+            <a:ext cx="1508857" cy="307777"/>
+          </a:xfrm>
+          <a:prstGeom prst="teardrop">
+            <a:avLst/>
+          </a:prstGeom>
+          <a:solidFill>
+            <a:schemeClr val="accent4">
+              <a:lumMod val="40000"/>
+              <a:lumOff val="60000"/>
+            </a:schemeClr>
+          </a:solidFill>
+          <a:ln>
+            <a:solidFill>
+              <a:schemeClr val="tx1"/>
+            </a:solidFill>
+          </a:ln>
+        </p:spPr>
+        <p:style>
+          <a:lnRef idx="2">
+            <a:schemeClr val="accent1">
+              <a:shade val="15000"/>
+            </a:schemeClr>
+          </a:lnRef>
+          <a:fillRef idx="1">
+            <a:schemeClr val="accent1"/>
+          </a:fillRef>
+          <a:effectRef idx="0">
+            <a:schemeClr val="accent1"/>
+          </a:effectRef>
+          <a:fontRef idx="minor">
+            <a:schemeClr val="lt1"/>
+          </a:fontRef>
+        </p:style>
+        <p:txBody>
+          <a:bodyPr rtlCol="0" anchor="ctr"/>
+          <a:lstStyle/>
+          <a:p>
+            <a:pPr algn="ctr"/>
+            <a:r>
+              <a:rPr lang="en-US" sz="1200" dirty="0">
+                <a:solidFill>
+                  <a:schemeClr val="tx1"/>
+                </a:solidFill>
+              </a:rPr>
+              <a:t>Library.dll</a:t>
+            </a:r>
+          </a:p>
+        </p:txBody>
+      </p:sp>
+      <p:sp>
+        <p:nvSpPr>
+          <p:cNvPr id="3" name="Teardrop 2">
+            <a:extLst>
+              <a:ext uri="{FF2B5EF4-FFF2-40B4-BE49-F238E27FC236}">
+                <a16:creationId xmlns:a16="http://schemas.microsoft.com/office/drawing/2014/main" id="{E64F3C3B-B51E-BAEE-B66E-8F15064BA760}"/>
+              </a:ext>
+            </a:extLst>
+          </p:cNvPr>
+          <p:cNvSpPr/>
+          <p:nvPr/>
+        </p:nvSpPr>
+        <p:spPr>
+          <a:xfrm>
+            <a:off x="342451" y="3656099"/>
+            <a:ext cx="2446254" cy="223654"/>
+          </a:xfrm>
+          <a:prstGeom prst="teardrop">
+            <a:avLst/>
+          </a:prstGeom>
+          <a:solidFill>
+            <a:schemeClr val="accent4">
+              <a:lumMod val="40000"/>
+              <a:lumOff val="60000"/>
+            </a:schemeClr>
+          </a:solidFill>
+          <a:ln>
+            <a:solidFill>
+              <a:schemeClr val="tx1"/>
+            </a:solidFill>
+          </a:ln>
+        </p:spPr>
+        <p:style>
+          <a:lnRef idx="2">
+            <a:schemeClr val="accent1">
+              <a:shade val="15000"/>
+            </a:schemeClr>
+          </a:lnRef>
+          <a:fillRef idx="1">
+            <a:schemeClr val="accent1"/>
+          </a:fillRef>
+          <a:effectRef idx="0">
+            <a:schemeClr val="accent1"/>
+          </a:effectRef>
+          <a:fontRef idx="minor">
+            <a:schemeClr val="lt1"/>
+          </a:fontRef>
+        </p:style>
+        <p:txBody>
+          <a:bodyPr rtlCol="0" anchor="ctr"/>
+          <a:lstStyle/>
+          <a:p>
+            <a:pPr algn="ctr"/>
+            <a:r>
+              <a:rPr lang="en-US" sz="1200" dirty="0">
+                <a:solidFill>
+                  <a:schemeClr val="tx1"/>
+                </a:solidFill>
+              </a:rPr>
+              <a:t>Main.Presentation.dll</a:t>
+            </a:r>
+          </a:p>
+        </p:txBody>
+      </p:sp>
+      <p:sp>
+        <p:nvSpPr>
+          <p:cNvPr id="5" name="Teardrop 4">
+            <a:extLst>
+              <a:ext uri="{FF2B5EF4-FFF2-40B4-BE49-F238E27FC236}">
+                <a16:creationId xmlns:a16="http://schemas.microsoft.com/office/drawing/2014/main" id="{1F8FE984-6C73-9CDB-D0D1-ECA1CC961790}"/>
+              </a:ext>
+            </a:extLst>
+          </p:cNvPr>
+          <p:cNvSpPr/>
+          <p:nvPr/>
+        </p:nvSpPr>
+        <p:spPr>
+          <a:xfrm>
+            <a:off x="5916057" y="3608805"/>
+            <a:ext cx="3062033" cy="359098"/>
+          </a:xfrm>
+          <a:prstGeom prst="teardrop">
+            <a:avLst/>
+          </a:prstGeom>
+          <a:solidFill>
+            <a:schemeClr val="accent4">
+              <a:lumMod val="40000"/>
+              <a:lumOff val="60000"/>
+            </a:schemeClr>
+          </a:solidFill>
+          <a:ln>
+            <a:solidFill>
+              <a:schemeClr val="tx1"/>
+            </a:solidFill>
+          </a:ln>
+        </p:spPr>
+        <p:style>
+          <a:lnRef idx="2">
+            <a:schemeClr val="accent1">
+              <a:shade val="15000"/>
+            </a:schemeClr>
+          </a:lnRef>
+          <a:fillRef idx="1">
+            <a:schemeClr val="accent1"/>
+          </a:fillRef>
+          <a:effectRef idx="0">
+            <a:schemeClr val="accent1"/>
+          </a:effectRef>
+          <a:fontRef idx="minor">
+            <a:schemeClr val="lt1"/>
+          </a:fontRef>
+        </p:style>
+        <p:txBody>
+          <a:bodyPr rtlCol="0" anchor="ctr"/>
+          <a:lstStyle/>
+          <a:p>
+            <a:pPr algn="ctr"/>
+            <a:r>
+              <a:rPr lang="en-US" sz="1200" dirty="0">
+                <a:solidFill>
+                  <a:schemeClr val="tx1"/>
+                </a:solidFill>
+              </a:rPr>
+              <a:t>HealthStatus.Presentation.dll</a:t>
+            </a:r>
+          </a:p>
+        </p:txBody>
+      </p:sp>
+      <p:sp>
+        <p:nvSpPr>
+          <p:cNvPr id="11" name="Teardrop 10">
+            <a:extLst>
+              <a:ext uri="{FF2B5EF4-FFF2-40B4-BE49-F238E27FC236}">
+                <a16:creationId xmlns:a16="http://schemas.microsoft.com/office/drawing/2014/main" id="{7A0EEBE0-7D59-5C1B-A3FC-06ADD3E92E19}"/>
+              </a:ext>
+            </a:extLst>
+          </p:cNvPr>
+          <p:cNvSpPr/>
+          <p:nvPr/>
+        </p:nvSpPr>
+        <p:spPr>
+          <a:xfrm>
+            <a:off x="27771" y="5686179"/>
+            <a:ext cx="4973887" cy="258546"/>
+          </a:xfrm>
+          <a:prstGeom prst="teardrop">
+            <a:avLst/>
+          </a:prstGeom>
+          <a:solidFill>
+            <a:schemeClr val="accent4">
+              <a:lumMod val="40000"/>
+              <a:lumOff val="60000"/>
+            </a:schemeClr>
+          </a:solidFill>
+          <a:ln>
+            <a:solidFill>
+              <a:schemeClr val="tx1"/>
+            </a:solidFill>
+          </a:ln>
+        </p:spPr>
+        <p:style>
+          <a:lnRef idx="2">
+            <a:schemeClr val="accent1">
+              <a:shade val="15000"/>
+            </a:schemeClr>
+          </a:lnRef>
+          <a:fillRef idx="1">
+            <a:schemeClr val="accent1"/>
+          </a:fillRef>
+          <a:effectRef idx="0">
+            <a:schemeClr val="accent1"/>
+          </a:effectRef>
+          <a:fontRef idx="minor">
+            <a:schemeClr val="lt1"/>
+          </a:fontRef>
+        </p:style>
+        <p:txBody>
+          <a:bodyPr rtlCol="0" anchor="ctr"/>
+          <a:lstStyle/>
+          <a:p>
+            <a:pPr algn="ctr"/>
+            <a:r>
+              <a:rPr lang="en-US" sz="1200" dirty="0">
+                <a:solidFill>
+                  <a:schemeClr val="tx1"/>
+                </a:solidFill>
+              </a:rPr>
+              <a:t>Resources defined in MP</a:t>
+            </a:r>
+          </a:p>
+        </p:txBody>
+      </p:sp>
+      <p:cxnSp>
+        <p:nvCxnSpPr>
+          <p:cNvPr id="17" name="Straight Connector 16">
+            <a:extLst>
+              <a:ext uri="{FF2B5EF4-FFF2-40B4-BE49-F238E27FC236}">
+                <a16:creationId xmlns:a16="http://schemas.microsoft.com/office/drawing/2014/main" id="{E1E0FA9A-E4CE-CF93-CDAE-2885E094728F}"/>
+              </a:ext>
+            </a:extLst>
+          </p:cNvPr>
+          <p:cNvCxnSpPr/>
+          <p:nvPr/>
+        </p:nvCxnSpPr>
+        <p:spPr>
+          <a:xfrm>
+            <a:off x="132201" y="5297260"/>
+            <a:ext cx="11863856" cy="0"/>
+          </a:xfrm>
+          <a:prstGeom prst="line">
+            <a:avLst/>
+          </a:prstGeom>
+        </p:spPr>
+        <p:style>
+          <a:lnRef idx="2">
+            <a:schemeClr val="accent1"/>
+          </a:lnRef>
+          <a:fillRef idx="0">
+            <a:schemeClr val="accent1"/>
+          </a:fillRef>
+          <a:effectRef idx="1">
+            <a:schemeClr val="accent1"/>
+          </a:effectRef>
+          <a:fontRef idx="minor">
+            <a:schemeClr val="tx1"/>
+          </a:fontRef>
+        </p:style>
+      </p:cxnSp>
     </p:spTree>
     <p:extLst>
       <p:ext uri="{BB962C8B-B14F-4D97-AF65-F5344CB8AC3E}">

</xml_diff>

<commit_message>
Smst.mpb telemetry and other stuff (#126)
* better Bundling

* lots of new and organized stuff

* better exception handling with async/await

* made Telemetry usage much simpler for future new modules.

* fixed nullrefexception bug

* cleaning, reorganizing

* lots of cleaning, restructering + Telemetry.SequenceID

* added healthstatus and subscription related telemetry

* Telemetry now better (still found some rare bugs, but ignoring...)

* Looged exceptions are also send as Telemetry

* removed old files

* now, MPB generation does not require any SM component. This is needed in order to run in ADO

* corrected wording

* made ready of prod

---------

Co-authored-by: Kubilay <khusmeno@khusmeno.com>
</commit_message>
<xml_diff>
--- a/SCSM.Support.Tools.mpb/Misc/MP_Dependencies.pptx
+++ b/SCSM.Support.Tools.mpb/Misc/MP_Dependencies.pptx
@@ -104,7 +104,89 @@
       </a:defRPr>
     </a:lvl9pPr>
   </p:defaultTextStyle>
+  <p:extLst>
+    <p:ext uri="{EFAFB233-063F-42B5-8137-9DF3F51BA10A}">
+      <p15:sldGuideLst xmlns:p15="http://schemas.microsoft.com/office/powerpoint/2012/main"/>
+    </p:ext>
+  </p:extLst>
 </p:presentation>
+</file>
+
+<file path=ppt/revisionInfo.xml><?xml version="1.0" encoding="utf-8"?>
+<p1510:revInfo xmlns:a="http://schemas.openxmlformats.org/drawingml/2006/main" xmlns:r="http://schemas.openxmlformats.org/officeDocument/2006/relationships" xmlns:p1510="http://schemas.microsoft.com/office/powerpoint/2015/10/main">
+  <p1510:revLst>
+    <p1510:client id="{25CC26F4-E22D-4756-8F38-5EFF1A97F774}" v="3" dt="2024-02-16T14:35:35.616"/>
+  </p1510:revLst>
+</p1510:revInfo>
+</file>
+
+<file path=ppt/changesInfos/changesInfo1.xml><?xml version="1.0" encoding="utf-8"?>
+<pc:chgInfo xmlns:a="http://schemas.openxmlformats.org/drawingml/2006/main" xmlns:r="http://schemas.openxmlformats.org/officeDocument/2006/relationships" xmlns:ac="http://schemas.microsoft.com/office/drawing/2013/main/command" xmlns:pc="http://schemas.microsoft.com/office/powerpoint/2013/main/command">
+  <pc:docChgLst>
+    <pc:chgData name="Kubilay Hüsmenoglu" userId="613ddf6e-fb7a-458e-b2da-f8a80fdeaf92" providerId="ADAL" clId="{25CC26F4-E22D-4756-8F38-5EFF1A97F774}"/>
+    <pc:docChg chg="modSld">
+      <pc:chgData name="Kubilay Hüsmenoglu" userId="613ddf6e-fb7a-458e-b2da-f8a80fdeaf92" providerId="ADAL" clId="{25CC26F4-E22D-4756-8F38-5EFF1A97F774}" dt="2024-02-16T14:36:34.843" v="87" actId="1036"/>
+      <pc:docMkLst>
+        <pc:docMk/>
+      </pc:docMkLst>
+      <pc:sldChg chg="addSp modSp mod">
+        <pc:chgData name="Kubilay Hüsmenoglu" userId="613ddf6e-fb7a-458e-b2da-f8a80fdeaf92" providerId="ADAL" clId="{25CC26F4-E22D-4756-8F38-5EFF1A97F774}" dt="2024-02-16T14:36:34.843" v="87" actId="1036"/>
+        <pc:sldMkLst>
+          <pc:docMk/>
+          <pc:sldMk cId="3155418598" sldId="256"/>
+        </pc:sldMkLst>
+        <pc:spChg chg="add mod">
+          <ac:chgData name="Kubilay Hüsmenoglu" userId="613ddf6e-fb7a-458e-b2da-f8a80fdeaf92" providerId="ADAL" clId="{25CC26F4-E22D-4756-8F38-5EFF1A97F774}" dt="2024-02-16T14:34:03.476" v="27" actId="14100"/>
+          <ac:spMkLst>
+            <pc:docMk/>
+            <pc:sldMk cId="3155418598" sldId="256"/>
+            <ac:spMk id="2" creationId="{2CC1710A-2DCE-7FC9-2C27-778E83819348}"/>
+          </ac:spMkLst>
+        </pc:spChg>
+        <pc:spChg chg="add mod">
+          <ac:chgData name="Kubilay Hüsmenoglu" userId="613ddf6e-fb7a-458e-b2da-f8a80fdeaf92" providerId="ADAL" clId="{25CC26F4-E22D-4756-8F38-5EFF1A97F774}" dt="2024-02-16T14:34:39.568" v="31" actId="14100"/>
+          <ac:spMkLst>
+            <pc:docMk/>
+            <pc:sldMk cId="3155418598" sldId="256"/>
+            <ac:spMk id="3" creationId="{E64F3C3B-B51E-BAEE-B66E-8F15064BA760}"/>
+          </ac:spMkLst>
+        </pc:spChg>
+        <pc:spChg chg="add mod">
+          <ac:chgData name="Kubilay Hüsmenoglu" userId="613ddf6e-fb7a-458e-b2da-f8a80fdeaf92" providerId="ADAL" clId="{25CC26F4-E22D-4756-8F38-5EFF1A97F774}" dt="2024-02-16T14:35:06.274" v="47" actId="14100"/>
+          <ac:spMkLst>
+            <pc:docMk/>
+            <pc:sldMk cId="3155418598" sldId="256"/>
+            <ac:spMk id="5" creationId="{1F8FE984-6C73-9CDB-D0D1-ECA1CC961790}"/>
+          </ac:spMkLst>
+        </pc:spChg>
+        <pc:spChg chg="add mod">
+          <ac:chgData name="Kubilay Hüsmenoglu" userId="613ddf6e-fb7a-458e-b2da-f8a80fdeaf92" providerId="ADAL" clId="{25CC26F4-E22D-4756-8F38-5EFF1A97F774}" dt="2024-02-16T14:36:02.190" v="84" actId="20577"/>
+          <ac:spMkLst>
+            <pc:docMk/>
+            <pc:sldMk cId="3155418598" sldId="256"/>
+            <ac:spMk id="11" creationId="{7A0EEBE0-7D59-5C1B-A3FC-06ADD3E92E19}"/>
+          </ac:spMkLst>
+        </pc:spChg>
+        <pc:spChg chg="mod">
+          <ac:chgData name="Kubilay Hüsmenoglu" userId="613ddf6e-fb7a-458e-b2da-f8a80fdeaf92" providerId="ADAL" clId="{25CC26F4-E22D-4756-8F38-5EFF1A97F774}" dt="2024-02-16T14:36:34.843" v="87" actId="1036"/>
+          <ac:spMkLst>
+            <pc:docMk/>
+            <pc:sldMk cId="3155418598" sldId="256"/>
+            <ac:spMk id="47" creationId="{5BF2C3F1-4C70-5AE8-D1BE-3C19CC6DE537}"/>
+          </ac:spMkLst>
+        </pc:spChg>
+        <pc:cxnChg chg="add">
+          <ac:chgData name="Kubilay Hüsmenoglu" userId="613ddf6e-fb7a-458e-b2da-f8a80fdeaf92" providerId="ADAL" clId="{25CC26F4-E22D-4756-8F38-5EFF1A97F774}" dt="2024-02-16T14:36:27.522" v="85" actId="11529"/>
+          <ac:cxnSpMkLst>
+            <pc:docMk/>
+            <pc:sldMk cId="3155418598" sldId="256"/>
+            <ac:cxnSpMk id="17" creationId="{E1E0FA9A-E4CE-CF93-CDAE-2885E094728F}"/>
+          </ac:cxnSpMkLst>
+        </pc:cxnChg>
+      </pc:sldChg>
+    </pc:docChg>
+  </pc:docChgLst>
+</pc:chgInfo>
 </file>
 
 <file path=ppt/slideLayouts/slideLayout1.xml><?xml version="1.0" encoding="utf-8"?>
@@ -254,7 +336,7 @@
           <a:p>
             <a:fld id="{C185314F-07B6-4DAB-A9C1-68515819A64A}" type="datetimeFigureOut">
               <a:rPr lang="en-US" smtClean="0"/>
-              <a:t>2/15/2024</a:t>
+              <a:t>2/16/2024</a:t>
             </a:fld>
             <a:endParaRPr lang="en-US"/>
           </a:p>
@@ -452,7 +534,7 @@
           <a:p>
             <a:fld id="{C185314F-07B6-4DAB-A9C1-68515819A64A}" type="datetimeFigureOut">
               <a:rPr lang="en-US" smtClean="0"/>
-              <a:t>2/15/2024</a:t>
+              <a:t>2/16/2024</a:t>
             </a:fld>
             <a:endParaRPr lang="en-US"/>
           </a:p>
@@ -660,7 +742,7 @@
           <a:p>
             <a:fld id="{C185314F-07B6-4DAB-A9C1-68515819A64A}" type="datetimeFigureOut">
               <a:rPr lang="en-US" smtClean="0"/>
-              <a:t>2/15/2024</a:t>
+              <a:t>2/16/2024</a:t>
             </a:fld>
             <a:endParaRPr lang="en-US"/>
           </a:p>
@@ -858,7 +940,7 @@
           <a:p>
             <a:fld id="{C185314F-07B6-4DAB-A9C1-68515819A64A}" type="datetimeFigureOut">
               <a:rPr lang="en-US" smtClean="0"/>
-              <a:t>2/15/2024</a:t>
+              <a:t>2/16/2024</a:t>
             </a:fld>
             <a:endParaRPr lang="en-US"/>
           </a:p>
@@ -1133,7 +1215,7 @@
           <a:p>
             <a:fld id="{C185314F-07B6-4DAB-A9C1-68515819A64A}" type="datetimeFigureOut">
               <a:rPr lang="en-US" smtClean="0"/>
-              <a:t>2/15/2024</a:t>
+              <a:t>2/16/2024</a:t>
             </a:fld>
             <a:endParaRPr lang="en-US"/>
           </a:p>
@@ -1398,7 +1480,7 @@
           <a:p>
             <a:fld id="{C185314F-07B6-4DAB-A9C1-68515819A64A}" type="datetimeFigureOut">
               <a:rPr lang="en-US" smtClean="0"/>
-              <a:t>2/15/2024</a:t>
+              <a:t>2/16/2024</a:t>
             </a:fld>
             <a:endParaRPr lang="en-US"/>
           </a:p>
@@ -1810,7 +1892,7 @@
           <a:p>
             <a:fld id="{C185314F-07B6-4DAB-A9C1-68515819A64A}" type="datetimeFigureOut">
               <a:rPr lang="en-US" smtClean="0"/>
-              <a:t>2/15/2024</a:t>
+              <a:t>2/16/2024</a:t>
             </a:fld>
             <a:endParaRPr lang="en-US"/>
           </a:p>
@@ -1951,7 +2033,7 @@
           <a:p>
             <a:fld id="{C185314F-07B6-4DAB-A9C1-68515819A64A}" type="datetimeFigureOut">
               <a:rPr lang="en-US" smtClean="0"/>
-              <a:t>2/15/2024</a:t>
+              <a:t>2/16/2024</a:t>
             </a:fld>
             <a:endParaRPr lang="en-US"/>
           </a:p>
@@ -2064,7 +2146,7 @@
           <a:p>
             <a:fld id="{C185314F-07B6-4DAB-A9C1-68515819A64A}" type="datetimeFigureOut">
               <a:rPr lang="en-US" smtClean="0"/>
-              <a:t>2/15/2024</a:t>
+              <a:t>2/16/2024</a:t>
             </a:fld>
             <a:endParaRPr lang="en-US"/>
           </a:p>
@@ -2375,7 +2457,7 @@
           <a:p>
             <a:fld id="{C185314F-07B6-4DAB-A9C1-68515819A64A}" type="datetimeFigureOut">
               <a:rPr lang="en-US" smtClean="0"/>
-              <a:t>2/15/2024</a:t>
+              <a:t>2/16/2024</a:t>
             </a:fld>
             <a:endParaRPr lang="en-US"/>
           </a:p>
@@ -2663,7 +2745,7 @@
           <a:p>
             <a:fld id="{C185314F-07B6-4DAB-A9C1-68515819A64A}" type="datetimeFigureOut">
               <a:rPr lang="en-US" smtClean="0"/>
-              <a:t>2/15/2024</a:t>
+              <a:t>2/16/2024</a:t>
             </a:fld>
             <a:endParaRPr lang="en-US"/>
           </a:p>
@@ -2904,7 +2986,7 @@
           <a:p>
             <a:fld id="{C185314F-07B6-4DAB-A9C1-68515819A64A}" type="datetimeFigureOut">
               <a:rPr lang="en-US" smtClean="0"/>
-              <a:t>2/15/2024</a:t>
+              <a:t>2/16/2024</a:t>
             </a:fld>
             <a:endParaRPr lang="en-US"/>
           </a:p>
@@ -4335,7 +4417,7 @@
         </p:nvSpPr>
         <p:spPr>
           <a:xfrm>
-            <a:off x="152771" y="5297260"/>
+            <a:off x="152771" y="5319294"/>
             <a:ext cx="11764407" cy="307777"/>
           </a:xfrm>
           <a:prstGeom prst="rect">
@@ -4357,6 +4439,298 @@
           </a:p>
         </p:txBody>
       </p:sp>
+      <p:sp>
+        <p:nvSpPr>
+          <p:cNvPr id="2" name="Teardrop 1">
+            <a:extLst>
+              <a:ext uri="{FF2B5EF4-FFF2-40B4-BE49-F238E27FC236}">
+                <a16:creationId xmlns:a16="http://schemas.microsoft.com/office/drawing/2014/main" id="{2CC1710A-2DCE-7FC9-2C27-778E83819348}"/>
+              </a:ext>
+            </a:extLst>
+          </p:cNvPr>
+          <p:cNvSpPr/>
+          <p:nvPr/>
+        </p:nvSpPr>
+        <p:spPr>
+          <a:xfrm>
+            <a:off x="342452" y="1938969"/>
+            <a:ext cx="1508857" cy="307777"/>
+          </a:xfrm>
+          <a:prstGeom prst="teardrop">
+            <a:avLst/>
+          </a:prstGeom>
+          <a:solidFill>
+            <a:schemeClr val="accent4">
+              <a:lumMod val="40000"/>
+              <a:lumOff val="60000"/>
+            </a:schemeClr>
+          </a:solidFill>
+          <a:ln>
+            <a:solidFill>
+              <a:schemeClr val="tx1"/>
+            </a:solidFill>
+          </a:ln>
+        </p:spPr>
+        <p:style>
+          <a:lnRef idx="2">
+            <a:schemeClr val="accent1">
+              <a:shade val="15000"/>
+            </a:schemeClr>
+          </a:lnRef>
+          <a:fillRef idx="1">
+            <a:schemeClr val="accent1"/>
+          </a:fillRef>
+          <a:effectRef idx="0">
+            <a:schemeClr val="accent1"/>
+          </a:effectRef>
+          <a:fontRef idx="minor">
+            <a:schemeClr val="lt1"/>
+          </a:fontRef>
+        </p:style>
+        <p:txBody>
+          <a:bodyPr rtlCol="0" anchor="ctr"/>
+          <a:lstStyle/>
+          <a:p>
+            <a:pPr algn="ctr"/>
+            <a:r>
+              <a:rPr lang="en-US" sz="1200" dirty="0">
+                <a:solidFill>
+                  <a:schemeClr val="tx1"/>
+                </a:solidFill>
+              </a:rPr>
+              <a:t>Library.dll</a:t>
+            </a:r>
+          </a:p>
+        </p:txBody>
+      </p:sp>
+      <p:sp>
+        <p:nvSpPr>
+          <p:cNvPr id="3" name="Teardrop 2">
+            <a:extLst>
+              <a:ext uri="{FF2B5EF4-FFF2-40B4-BE49-F238E27FC236}">
+                <a16:creationId xmlns:a16="http://schemas.microsoft.com/office/drawing/2014/main" id="{E64F3C3B-B51E-BAEE-B66E-8F15064BA760}"/>
+              </a:ext>
+            </a:extLst>
+          </p:cNvPr>
+          <p:cNvSpPr/>
+          <p:nvPr/>
+        </p:nvSpPr>
+        <p:spPr>
+          <a:xfrm>
+            <a:off x="342451" y="3656099"/>
+            <a:ext cx="2446254" cy="223654"/>
+          </a:xfrm>
+          <a:prstGeom prst="teardrop">
+            <a:avLst/>
+          </a:prstGeom>
+          <a:solidFill>
+            <a:schemeClr val="accent4">
+              <a:lumMod val="40000"/>
+              <a:lumOff val="60000"/>
+            </a:schemeClr>
+          </a:solidFill>
+          <a:ln>
+            <a:solidFill>
+              <a:schemeClr val="tx1"/>
+            </a:solidFill>
+          </a:ln>
+        </p:spPr>
+        <p:style>
+          <a:lnRef idx="2">
+            <a:schemeClr val="accent1">
+              <a:shade val="15000"/>
+            </a:schemeClr>
+          </a:lnRef>
+          <a:fillRef idx="1">
+            <a:schemeClr val="accent1"/>
+          </a:fillRef>
+          <a:effectRef idx="0">
+            <a:schemeClr val="accent1"/>
+          </a:effectRef>
+          <a:fontRef idx="minor">
+            <a:schemeClr val="lt1"/>
+          </a:fontRef>
+        </p:style>
+        <p:txBody>
+          <a:bodyPr rtlCol="0" anchor="ctr"/>
+          <a:lstStyle/>
+          <a:p>
+            <a:pPr algn="ctr"/>
+            <a:r>
+              <a:rPr lang="en-US" sz="1200" dirty="0">
+                <a:solidFill>
+                  <a:schemeClr val="tx1"/>
+                </a:solidFill>
+              </a:rPr>
+              <a:t>Main.Presentation.dll</a:t>
+            </a:r>
+          </a:p>
+        </p:txBody>
+      </p:sp>
+      <p:sp>
+        <p:nvSpPr>
+          <p:cNvPr id="5" name="Teardrop 4">
+            <a:extLst>
+              <a:ext uri="{FF2B5EF4-FFF2-40B4-BE49-F238E27FC236}">
+                <a16:creationId xmlns:a16="http://schemas.microsoft.com/office/drawing/2014/main" id="{1F8FE984-6C73-9CDB-D0D1-ECA1CC961790}"/>
+              </a:ext>
+            </a:extLst>
+          </p:cNvPr>
+          <p:cNvSpPr/>
+          <p:nvPr/>
+        </p:nvSpPr>
+        <p:spPr>
+          <a:xfrm>
+            <a:off x="5916057" y="3608805"/>
+            <a:ext cx="3062033" cy="359098"/>
+          </a:xfrm>
+          <a:prstGeom prst="teardrop">
+            <a:avLst/>
+          </a:prstGeom>
+          <a:solidFill>
+            <a:schemeClr val="accent4">
+              <a:lumMod val="40000"/>
+              <a:lumOff val="60000"/>
+            </a:schemeClr>
+          </a:solidFill>
+          <a:ln>
+            <a:solidFill>
+              <a:schemeClr val="tx1"/>
+            </a:solidFill>
+          </a:ln>
+        </p:spPr>
+        <p:style>
+          <a:lnRef idx="2">
+            <a:schemeClr val="accent1">
+              <a:shade val="15000"/>
+            </a:schemeClr>
+          </a:lnRef>
+          <a:fillRef idx="1">
+            <a:schemeClr val="accent1"/>
+          </a:fillRef>
+          <a:effectRef idx="0">
+            <a:schemeClr val="accent1"/>
+          </a:effectRef>
+          <a:fontRef idx="minor">
+            <a:schemeClr val="lt1"/>
+          </a:fontRef>
+        </p:style>
+        <p:txBody>
+          <a:bodyPr rtlCol="0" anchor="ctr"/>
+          <a:lstStyle/>
+          <a:p>
+            <a:pPr algn="ctr"/>
+            <a:r>
+              <a:rPr lang="en-US" sz="1200" dirty="0">
+                <a:solidFill>
+                  <a:schemeClr val="tx1"/>
+                </a:solidFill>
+              </a:rPr>
+              <a:t>HealthStatus.Presentation.dll</a:t>
+            </a:r>
+          </a:p>
+        </p:txBody>
+      </p:sp>
+      <p:sp>
+        <p:nvSpPr>
+          <p:cNvPr id="11" name="Teardrop 10">
+            <a:extLst>
+              <a:ext uri="{FF2B5EF4-FFF2-40B4-BE49-F238E27FC236}">
+                <a16:creationId xmlns:a16="http://schemas.microsoft.com/office/drawing/2014/main" id="{7A0EEBE0-7D59-5C1B-A3FC-06ADD3E92E19}"/>
+              </a:ext>
+            </a:extLst>
+          </p:cNvPr>
+          <p:cNvSpPr/>
+          <p:nvPr/>
+        </p:nvSpPr>
+        <p:spPr>
+          <a:xfrm>
+            <a:off x="27771" y="5686179"/>
+            <a:ext cx="4973887" cy="258546"/>
+          </a:xfrm>
+          <a:prstGeom prst="teardrop">
+            <a:avLst/>
+          </a:prstGeom>
+          <a:solidFill>
+            <a:schemeClr val="accent4">
+              <a:lumMod val="40000"/>
+              <a:lumOff val="60000"/>
+            </a:schemeClr>
+          </a:solidFill>
+          <a:ln>
+            <a:solidFill>
+              <a:schemeClr val="tx1"/>
+            </a:solidFill>
+          </a:ln>
+        </p:spPr>
+        <p:style>
+          <a:lnRef idx="2">
+            <a:schemeClr val="accent1">
+              <a:shade val="15000"/>
+            </a:schemeClr>
+          </a:lnRef>
+          <a:fillRef idx="1">
+            <a:schemeClr val="accent1"/>
+          </a:fillRef>
+          <a:effectRef idx="0">
+            <a:schemeClr val="accent1"/>
+          </a:effectRef>
+          <a:fontRef idx="minor">
+            <a:schemeClr val="lt1"/>
+          </a:fontRef>
+        </p:style>
+        <p:txBody>
+          <a:bodyPr rtlCol="0" anchor="ctr"/>
+          <a:lstStyle/>
+          <a:p>
+            <a:pPr algn="ctr"/>
+            <a:r>
+              <a:rPr lang="en-US" sz="1200" dirty="0">
+                <a:solidFill>
+                  <a:schemeClr val="tx1"/>
+                </a:solidFill>
+              </a:rPr>
+              <a:t>Resources defined in MP</a:t>
+            </a:r>
+          </a:p>
+        </p:txBody>
+      </p:sp>
+      <p:cxnSp>
+        <p:nvCxnSpPr>
+          <p:cNvPr id="17" name="Straight Connector 16">
+            <a:extLst>
+              <a:ext uri="{FF2B5EF4-FFF2-40B4-BE49-F238E27FC236}">
+                <a16:creationId xmlns:a16="http://schemas.microsoft.com/office/drawing/2014/main" id="{E1E0FA9A-E4CE-CF93-CDAE-2885E094728F}"/>
+              </a:ext>
+            </a:extLst>
+          </p:cNvPr>
+          <p:cNvCxnSpPr/>
+          <p:nvPr/>
+        </p:nvCxnSpPr>
+        <p:spPr>
+          <a:xfrm>
+            <a:off x="132201" y="5297260"/>
+            <a:ext cx="11863856" cy="0"/>
+          </a:xfrm>
+          <a:prstGeom prst="line">
+            <a:avLst/>
+          </a:prstGeom>
+        </p:spPr>
+        <p:style>
+          <a:lnRef idx="2">
+            <a:schemeClr val="accent1"/>
+          </a:lnRef>
+          <a:fillRef idx="0">
+            <a:schemeClr val="accent1"/>
+          </a:fillRef>
+          <a:effectRef idx="1">
+            <a:schemeClr val="accent1"/>
+          </a:effectRef>
+          <a:fontRef idx="minor">
+            <a:schemeClr val="tx1"/>
+          </a:fontRef>
+        </p:style>
+      </p:cxnSp>
     </p:spTree>
     <p:extLst>
       <p:ext uri="{BB962C8B-B14F-4D97-AF65-F5344CB8AC3E}">

</xml_diff>